<commit_message>
end the game by rounds
</commit_message>
<xml_diff>
--- a/gitImages/GameCommunicationDiagram.pptx
+++ b/gitImages/GameCommunicationDiagram.pptx
@@ -263,7 +263,7 @@
           <a:p>
             <a:fld id="{67DA5CD7-5721-4865-8FBC-0613AEE566BE}" type="datetimeFigureOut">
               <a:rPr lang="en-US" smtClean="0"/>
-              <a:t>10/23/2023</a:t>
+              <a:t>10/24/2023</a:t>
             </a:fld>
             <a:endParaRPr lang="en-US"/>
           </a:p>
@@ -461,7 +461,7 @@
           <a:p>
             <a:fld id="{67DA5CD7-5721-4865-8FBC-0613AEE566BE}" type="datetimeFigureOut">
               <a:rPr lang="en-US" smtClean="0"/>
-              <a:t>10/23/2023</a:t>
+              <a:t>10/24/2023</a:t>
             </a:fld>
             <a:endParaRPr lang="en-US"/>
           </a:p>
@@ -669,7 +669,7 @@
           <a:p>
             <a:fld id="{67DA5CD7-5721-4865-8FBC-0613AEE566BE}" type="datetimeFigureOut">
               <a:rPr lang="en-US" smtClean="0"/>
-              <a:t>10/23/2023</a:t>
+              <a:t>10/24/2023</a:t>
             </a:fld>
             <a:endParaRPr lang="en-US"/>
           </a:p>
@@ -867,7 +867,7 @@
           <a:p>
             <a:fld id="{67DA5CD7-5721-4865-8FBC-0613AEE566BE}" type="datetimeFigureOut">
               <a:rPr lang="en-US" smtClean="0"/>
-              <a:t>10/23/2023</a:t>
+              <a:t>10/24/2023</a:t>
             </a:fld>
             <a:endParaRPr lang="en-US"/>
           </a:p>
@@ -1142,7 +1142,7 @@
           <a:p>
             <a:fld id="{67DA5CD7-5721-4865-8FBC-0613AEE566BE}" type="datetimeFigureOut">
               <a:rPr lang="en-US" smtClean="0"/>
-              <a:t>10/23/2023</a:t>
+              <a:t>10/24/2023</a:t>
             </a:fld>
             <a:endParaRPr lang="en-US"/>
           </a:p>
@@ -1407,7 +1407,7 @@
           <a:p>
             <a:fld id="{67DA5CD7-5721-4865-8FBC-0613AEE566BE}" type="datetimeFigureOut">
               <a:rPr lang="en-US" smtClean="0"/>
-              <a:t>10/23/2023</a:t>
+              <a:t>10/24/2023</a:t>
             </a:fld>
             <a:endParaRPr lang="en-US"/>
           </a:p>
@@ -1819,7 +1819,7 @@
           <a:p>
             <a:fld id="{67DA5CD7-5721-4865-8FBC-0613AEE566BE}" type="datetimeFigureOut">
               <a:rPr lang="en-US" smtClean="0"/>
-              <a:t>10/23/2023</a:t>
+              <a:t>10/24/2023</a:t>
             </a:fld>
             <a:endParaRPr lang="en-US"/>
           </a:p>
@@ -1960,7 +1960,7 @@
           <a:p>
             <a:fld id="{67DA5CD7-5721-4865-8FBC-0613AEE566BE}" type="datetimeFigureOut">
               <a:rPr lang="en-US" smtClean="0"/>
-              <a:t>10/23/2023</a:t>
+              <a:t>10/24/2023</a:t>
             </a:fld>
             <a:endParaRPr lang="en-US"/>
           </a:p>
@@ -2073,7 +2073,7 @@
           <a:p>
             <a:fld id="{67DA5CD7-5721-4865-8FBC-0613AEE566BE}" type="datetimeFigureOut">
               <a:rPr lang="en-US" smtClean="0"/>
-              <a:t>10/23/2023</a:t>
+              <a:t>10/24/2023</a:t>
             </a:fld>
             <a:endParaRPr lang="en-US"/>
           </a:p>
@@ -2384,7 +2384,7 @@
           <a:p>
             <a:fld id="{67DA5CD7-5721-4865-8FBC-0613AEE566BE}" type="datetimeFigureOut">
               <a:rPr lang="en-US" smtClean="0"/>
-              <a:t>10/23/2023</a:t>
+              <a:t>10/24/2023</a:t>
             </a:fld>
             <a:endParaRPr lang="en-US"/>
           </a:p>
@@ -2672,7 +2672,7 @@
           <a:p>
             <a:fld id="{67DA5CD7-5721-4865-8FBC-0613AEE566BE}" type="datetimeFigureOut">
               <a:rPr lang="en-US" smtClean="0"/>
-              <a:t>10/23/2023</a:t>
+              <a:t>10/24/2023</a:t>
             </a:fld>
             <a:endParaRPr lang="en-US"/>
           </a:p>
@@ -2913,7 +2913,7 @@
           <a:p>
             <a:fld id="{67DA5CD7-5721-4865-8FBC-0613AEE566BE}" type="datetimeFigureOut">
               <a:rPr lang="en-US" smtClean="0"/>
-              <a:t>10/23/2023</a:t>
+              <a:t>10/24/2023</a:t>
             </a:fld>
             <a:endParaRPr lang="en-US"/>
           </a:p>
@@ -4230,7 +4230,7 @@
                   <a:schemeClr val="tx1"/>
                 </a:solidFill>
               </a:rPr>
-              <a:t>getAction</a:t>
+              <a:t>get_action</a:t>
             </a:r>
             <a:r>
               <a:rPr lang="en-US" sz="1000" dirty="0">
@@ -5129,7 +5129,7 @@
         <p:spPr>
           <a:xfrm>
             <a:off x="8119616" y="4035885"/>
-            <a:ext cx="1159933" cy="387350"/>
+            <a:ext cx="1327558" cy="387350"/>
           </a:xfrm>
           <a:prstGeom prst="roundRect">
             <a:avLst>
@@ -5177,7 +5177,7 @@
                   <a:schemeClr val="tx1"/>
                 </a:solidFill>
               </a:rPr>
-              <a:t>actionUpdate</a:t>
+              <a:t>update_my_actions</a:t>
             </a:r>
             <a:r>
               <a:rPr lang="en-US" sz="1000" dirty="0">
@@ -5398,7 +5398,7 @@
         <p:spPr>
           <a:xfrm>
             <a:off x="8165294" y="5235307"/>
-            <a:ext cx="1159933" cy="387350"/>
+            <a:ext cx="1364469" cy="387350"/>
           </a:xfrm>
           <a:prstGeom prst="roundRect">
             <a:avLst>
@@ -5446,7 +5446,7 @@
                   <a:schemeClr val="tx1"/>
                 </a:solidFill>
               </a:rPr>
-              <a:t>matchUpdate</a:t>
+              <a:t>update_end_match</a:t>
             </a:r>
             <a:r>
               <a:rPr lang="en-US" sz="1000" dirty="0">
@@ -5473,8 +5473,8 @@
         </p:nvSpPr>
         <p:spPr>
           <a:xfrm>
-            <a:off x="8196359" y="1281092"/>
-            <a:ext cx="1159933" cy="387350"/>
+            <a:off x="8100395" y="1281092"/>
+            <a:ext cx="1255898" cy="387350"/>
           </a:xfrm>
           <a:prstGeom prst="roundRect">
             <a:avLst>
@@ -5522,7 +5522,7 @@
                   <a:schemeClr val="tx1"/>
                 </a:solidFill>
               </a:rPr>
-              <a:t>doSpecialAction</a:t>
+              <a:t>do_special_action</a:t>
             </a:r>
             <a:r>
               <a:rPr lang="en-US" sz="1000" dirty="0">
@@ -5621,7 +5621,7 @@
         <p:spPr>
           <a:xfrm flipV="1">
             <a:off x="4578287" y="1474767"/>
-            <a:ext cx="3618072" cy="2139"/>
+            <a:ext cx="3522108" cy="2139"/>
           </a:xfrm>
           <a:prstGeom prst="bentConnector3">
             <a:avLst/>
@@ -5771,8 +5771,8 @@
         </p:nvSpPr>
         <p:spPr>
           <a:xfrm>
-            <a:off x="8196359" y="1741751"/>
-            <a:ext cx="1159933" cy="387350"/>
+            <a:off x="8100395" y="1741751"/>
+            <a:ext cx="1429368" cy="387350"/>
           </a:xfrm>
           <a:prstGeom prst="roundRect">
             <a:avLst>
@@ -5820,7 +5820,7 @@
                   <a:schemeClr val="tx1"/>
                 </a:solidFill>
               </a:rPr>
-              <a:t>exchangeCards</a:t>
+              <a:t>get_exchanged_cards</a:t>
             </a:r>
             <a:r>
               <a:rPr lang="en-US" sz="1000" dirty="0">
@@ -6085,6 +6085,7 @@
             </a:extLst>
           </p:cNvPr>
           <p:cNvCxnSpPr>
+            <a:cxnSpLocks/>
             <a:stCxn id="122" idx="3"/>
             <a:endCxn id="123" idx="1"/>
           </p:cNvCxnSpPr>
@@ -6093,7 +6094,7 @@
         <p:spPr>
           <a:xfrm flipV="1">
             <a:off x="4577599" y="1935426"/>
-            <a:ext cx="3618760" cy="1564"/>
+            <a:ext cx="3522796" cy="1564"/>
           </a:xfrm>
           <a:prstGeom prst="bentConnector3">
             <a:avLst/>
@@ -6659,8 +6660,8 @@
         </p:nvSpPr>
         <p:spPr>
           <a:xfrm>
-            <a:off x="10178735" y="4696489"/>
-            <a:ext cx="1159933" cy="387350"/>
+            <a:off x="10107849" y="4696489"/>
+            <a:ext cx="1496022" cy="387350"/>
           </a:xfrm>
           <a:prstGeom prst="roundRect">
             <a:avLst>
@@ -6708,7 +6709,7 @@
                   <a:schemeClr val="tx1"/>
                 </a:solidFill>
               </a:rPr>
-              <a:t>observeOthers</a:t>
+              <a:t>update_action_others</a:t>
             </a:r>
             <a:r>
               <a:rPr lang="en-US" sz="1000" dirty="0">
@@ -6736,7 +6737,7 @@
         <p:spPr>
           <a:xfrm>
             <a:off x="10203503" y="5892538"/>
-            <a:ext cx="1159933" cy="387350"/>
+            <a:ext cx="1336345" cy="387350"/>
           </a:xfrm>
           <a:prstGeom prst="roundRect">
             <a:avLst>
@@ -6784,7 +6785,7 @@
                   <a:schemeClr val="tx1"/>
                 </a:solidFill>
               </a:rPr>
-              <a:t>matchUpdate</a:t>
+              <a:t>update_end_match</a:t>
             </a:r>
             <a:r>
               <a:rPr lang="en-US" sz="1000" dirty="0">
@@ -6850,6 +6851,7 @@
             </a:extLst>
           </p:cNvPr>
           <p:cNvCxnSpPr>
+            <a:cxnSpLocks/>
             <a:stCxn id="14" idx="3"/>
             <a:endCxn id="225" idx="1"/>
           </p:cNvCxnSpPr>
@@ -6858,7 +6860,7 @@
         <p:spPr>
           <a:xfrm>
             <a:off x="7368671" y="4616841"/>
-            <a:ext cx="2810064" cy="273323"/>
+            <a:ext cx="2739178" cy="273323"/>
           </a:xfrm>
           <a:prstGeom prst="bentConnector3">
             <a:avLst>
@@ -6895,6 +6897,7 @@
             </a:extLst>
           </p:cNvPr>
           <p:cNvCxnSpPr>
+            <a:cxnSpLocks/>
             <a:endCxn id="75" idx="1"/>
           </p:cNvCxnSpPr>
           <p:nvPr/>
@@ -7181,6 +7184,127 @@
           </a:p>
         </p:txBody>
       </p:sp>
+      <p:sp>
+        <p:nvSpPr>
+          <p:cNvPr id="2" name="Rectangle: Rounded Corners 1">
+            <a:extLst>
+              <a:ext uri="{FF2B5EF4-FFF2-40B4-BE49-F238E27FC236}">
+                <a16:creationId xmlns:a16="http://schemas.microsoft.com/office/drawing/2014/main" id="{41DC9323-43EE-91D7-CE22-53F17D8FB666}"/>
+              </a:ext>
+            </a:extLst>
+          </p:cNvPr>
+          <p:cNvSpPr/>
+          <p:nvPr/>
+        </p:nvSpPr>
+        <p:spPr>
+          <a:xfrm>
+            <a:off x="7934325" y="472377"/>
+            <a:ext cx="1595438" cy="387350"/>
+          </a:xfrm>
+          <a:prstGeom prst="roundRect">
+            <a:avLst>
+              <a:gd name="adj" fmla="val 3342"/>
+            </a:avLst>
+          </a:prstGeom>
+          <a:solidFill>
+            <a:schemeClr val="accent6">
+              <a:lumMod val="75000"/>
+              <a:alpha val="10196"/>
+            </a:schemeClr>
+          </a:solidFill>
+          <a:ln>
+            <a:solidFill>
+              <a:srgbClr val="172C51">
+                <a:alpha val="23137"/>
+              </a:srgbClr>
+            </a:solidFill>
+          </a:ln>
+        </p:spPr>
+        <p:style>
+          <a:lnRef idx="2">
+            <a:schemeClr val="accent1">
+              <a:shade val="15000"/>
+            </a:schemeClr>
+          </a:lnRef>
+          <a:fillRef idx="1">
+            <a:schemeClr val="accent1"/>
+          </a:fillRef>
+          <a:effectRef idx="0">
+            <a:schemeClr val="accent1"/>
+          </a:effectRef>
+          <a:fontRef idx="minor">
+            <a:schemeClr val="lt1"/>
+          </a:fontRef>
+        </p:style>
+        <p:txBody>
+          <a:bodyPr rtlCol="0" anchor="ctr"/>
+          <a:lstStyle/>
+          <a:p>
+            <a:r>
+              <a:rPr lang="en-US" sz="1000" dirty="0" err="1">
+                <a:solidFill>
+                  <a:schemeClr val="tx1"/>
+                </a:solidFill>
+                <a:effectLst/>
+                <a:latin typeface="Calibri (Body)"/>
+              </a:rPr>
+              <a:t>update_start_match</a:t>
+            </a:r>
+            <a:r>
+              <a:rPr lang="en-US" sz="1000" dirty="0">
+                <a:solidFill>
+                  <a:schemeClr val="tx1"/>
+                </a:solidFill>
+                <a:effectLst/>
+                <a:latin typeface="Calibri (Body)"/>
+              </a:rPr>
+              <a:t>()</a:t>
+            </a:r>
+          </a:p>
+        </p:txBody>
+      </p:sp>
+      <p:cxnSp>
+        <p:nvCxnSpPr>
+          <p:cNvPr id="4" name="Connector: Elbow 3">
+            <a:extLst>
+              <a:ext uri="{FF2B5EF4-FFF2-40B4-BE49-F238E27FC236}">
+                <a16:creationId xmlns:a16="http://schemas.microsoft.com/office/drawing/2014/main" id="{25D8BC93-6C79-5F53-7BE2-FFBEFD375B14}"/>
+              </a:ext>
+            </a:extLst>
+          </p:cNvPr>
+          <p:cNvCxnSpPr>
+            <a:endCxn id="2" idx="1"/>
+          </p:cNvCxnSpPr>
+          <p:nvPr/>
+        </p:nvCxnSpPr>
+        <p:spPr>
+          <a:xfrm flipV="1">
+            <a:off x="3024527" y="666052"/>
+            <a:ext cx="4909798" cy="359459"/>
+          </a:xfrm>
+          <a:prstGeom prst="bentConnector3">
+            <a:avLst/>
+          </a:prstGeom>
+          <a:ln>
+            <a:prstDash val="dash"/>
+            <a:tailEnd type="triangle"/>
+          </a:ln>
+        </p:spPr>
+        <p:style>
+          <a:lnRef idx="3">
+            <a:schemeClr val="accent2"/>
+          </a:lnRef>
+          <a:fillRef idx="0">
+            <a:schemeClr val="accent2"/>
+          </a:fillRef>
+          <a:effectRef idx="2">
+            <a:schemeClr val="accent2"/>
+          </a:effectRef>
+          <a:fontRef idx="minor">
+            <a:schemeClr val="tx1"/>
+          </a:fontRef>
+        </p:style>
+      </p:cxnSp>
     </p:spTree>
     <p:extLst>
       <p:ext uri="{BB962C8B-B14F-4D97-AF65-F5344CB8AC3E}">
@@ -8233,7 +8357,7 @@
                   <a:schemeClr val="tx1"/>
                 </a:solidFill>
               </a:rPr>
-              <a:t>getAction</a:t>
+              <a:t>get_action</a:t>
             </a:r>
             <a:r>
               <a:rPr lang="en-US" sz="1000" dirty="0">
@@ -9132,7 +9256,7 @@
         <p:spPr>
           <a:xfrm>
             <a:off x="8768601" y="4436668"/>
-            <a:ext cx="1159933" cy="387350"/>
+            <a:ext cx="1339893" cy="387350"/>
           </a:xfrm>
           <a:prstGeom prst="roundRect">
             <a:avLst>
@@ -9180,7 +9304,7 @@
                   <a:schemeClr val="tx1"/>
                 </a:solidFill>
               </a:rPr>
-              <a:t>actionUpdate</a:t>
+              <a:t>update_my_actions</a:t>
             </a:r>
             <a:r>
               <a:rPr lang="en-US" sz="1000" dirty="0">
@@ -9401,7 +9525,7 @@
         <p:spPr>
           <a:xfrm>
             <a:off x="8756189" y="5407314"/>
-            <a:ext cx="1159933" cy="387350"/>
+            <a:ext cx="1339160" cy="387350"/>
           </a:xfrm>
           <a:prstGeom prst="roundRect">
             <a:avLst>
@@ -9449,7 +9573,7 @@
                   <a:schemeClr val="tx1"/>
                 </a:solidFill>
               </a:rPr>
-              <a:t>matchUpdate</a:t>
+              <a:t>update_end_match</a:t>
             </a:r>
             <a:r>
               <a:rPr lang="en-US" sz="1000" dirty="0">
@@ -9477,7 +9601,7 @@
         <p:spPr>
           <a:xfrm>
             <a:off x="8898457" y="828080"/>
-            <a:ext cx="1159933" cy="387350"/>
+            <a:ext cx="1263025" cy="387350"/>
           </a:xfrm>
           <a:prstGeom prst="roundRect">
             <a:avLst>
@@ -9525,7 +9649,7 @@
                   <a:schemeClr val="tx1"/>
                 </a:solidFill>
               </a:rPr>
-              <a:t>doSpecialAction</a:t>
+              <a:t>do_special_action</a:t>
             </a:r>
             <a:r>
               <a:rPr lang="en-US" sz="1000" dirty="0">
@@ -9774,8 +9898,8 @@
         </p:nvSpPr>
         <p:spPr>
           <a:xfrm>
-            <a:off x="8938098" y="1512671"/>
-            <a:ext cx="1159933" cy="387350"/>
+            <a:off x="8648086" y="1512671"/>
+            <a:ext cx="1449946" cy="387350"/>
           </a:xfrm>
           <a:prstGeom prst="roundRect">
             <a:avLst>
@@ -9823,7 +9947,7 @@
                   <a:schemeClr val="tx1"/>
                 </a:solidFill>
               </a:rPr>
-              <a:t>exchangeCards</a:t>
+              <a:t>get_exchanged_cards</a:t>
             </a:r>
             <a:r>
               <a:rPr lang="en-US" sz="1000" dirty="0">
@@ -10580,7 +10704,7 @@
         <p:spPr>
           <a:xfrm>
             <a:off x="10669280" y="4696489"/>
-            <a:ext cx="1159933" cy="387350"/>
+            <a:ext cx="1433517" cy="387350"/>
           </a:xfrm>
           <a:prstGeom prst="roundRect">
             <a:avLst>
@@ -10628,7 +10752,7 @@
                   <a:schemeClr val="tx1"/>
                 </a:solidFill>
               </a:rPr>
-              <a:t>observeOthers</a:t>
+              <a:t>update_action_others</a:t>
             </a:r>
             <a:r>
               <a:rPr lang="en-US" sz="1000" dirty="0">
@@ -10656,7 +10780,7 @@
         <p:spPr>
           <a:xfrm>
             <a:off x="10694048" y="5892538"/>
-            <a:ext cx="1159933" cy="387350"/>
+            <a:ext cx="1395604" cy="387350"/>
           </a:xfrm>
           <a:prstGeom prst="roundRect">
             <a:avLst>
@@ -10704,7 +10828,7 @@
                   <a:schemeClr val="tx1"/>
                 </a:solidFill>
               </a:rPr>
-              <a:t>matchUpdate</a:t>
+              <a:t>update_end_match</a:t>
             </a:r>
             <a:r>
               <a:rPr lang="en-US" sz="1000" dirty="0">
@@ -11132,7 +11256,7 @@
         <p:spPr>
           <a:xfrm>
             <a:off x="7891964" y="1201081"/>
-            <a:ext cx="1046134" cy="505265"/>
+            <a:ext cx="756122" cy="505265"/>
           </a:xfrm>
           <a:prstGeom prst="bentConnector3">
             <a:avLst/>
@@ -11210,8 +11334,8 @@
         </p:nvCxnSpPr>
         <p:spPr>
           <a:xfrm rot="5400000">
-            <a:off x="8666833" y="1115143"/>
-            <a:ext cx="66354" cy="1636111"/>
+            <a:off x="8594330" y="1187646"/>
+            <a:ext cx="66354" cy="1491105"/>
           </a:xfrm>
           <a:prstGeom prst="bentConnector2">
             <a:avLst/>
@@ -12448,6 +12572,170 @@
           </a:p>
         </p:txBody>
       </p:sp>
+      <p:sp>
+        <p:nvSpPr>
+          <p:cNvPr id="30" name="Rectangle: Rounded Corners 29">
+            <a:extLst>
+              <a:ext uri="{FF2B5EF4-FFF2-40B4-BE49-F238E27FC236}">
+                <a16:creationId xmlns:a16="http://schemas.microsoft.com/office/drawing/2014/main" id="{BDAD0E85-A20F-7ADE-66C8-BCE75E5CD124}"/>
+              </a:ext>
+            </a:extLst>
+          </p:cNvPr>
+          <p:cNvSpPr/>
+          <p:nvPr/>
+        </p:nvSpPr>
+        <p:spPr>
+          <a:xfrm>
+            <a:off x="8538436" y="371046"/>
+            <a:ext cx="1595438" cy="387350"/>
+          </a:xfrm>
+          <a:prstGeom prst="roundRect">
+            <a:avLst>
+              <a:gd name="adj" fmla="val 3342"/>
+            </a:avLst>
+          </a:prstGeom>
+          <a:solidFill>
+            <a:schemeClr val="accent6">
+              <a:lumMod val="75000"/>
+              <a:alpha val="10196"/>
+            </a:schemeClr>
+          </a:solidFill>
+          <a:ln>
+            <a:solidFill>
+              <a:srgbClr val="172C51">
+                <a:alpha val="23137"/>
+              </a:srgbClr>
+            </a:solidFill>
+          </a:ln>
+        </p:spPr>
+        <p:style>
+          <a:lnRef idx="2">
+            <a:schemeClr val="accent1">
+              <a:shade val="15000"/>
+            </a:schemeClr>
+          </a:lnRef>
+          <a:fillRef idx="1">
+            <a:schemeClr val="accent1"/>
+          </a:fillRef>
+          <a:effectRef idx="0">
+            <a:schemeClr val="accent1"/>
+          </a:effectRef>
+          <a:fontRef idx="minor">
+            <a:schemeClr val="lt1"/>
+          </a:fontRef>
+        </p:style>
+        <p:txBody>
+          <a:bodyPr rtlCol="0" anchor="ctr"/>
+          <a:lstStyle/>
+          <a:p>
+            <a:r>
+              <a:rPr lang="en-US" sz="1000" dirty="0" err="1">
+                <a:solidFill>
+                  <a:schemeClr val="tx1"/>
+                </a:solidFill>
+                <a:effectLst/>
+                <a:latin typeface="Calibri (Body)"/>
+              </a:rPr>
+              <a:t>update_start_match</a:t>
+            </a:r>
+            <a:r>
+              <a:rPr lang="en-US" sz="1000" dirty="0">
+                <a:solidFill>
+                  <a:schemeClr val="tx1"/>
+                </a:solidFill>
+                <a:effectLst/>
+                <a:latin typeface="Calibri (Body)"/>
+              </a:rPr>
+              <a:t>()</a:t>
+            </a:r>
+          </a:p>
+        </p:txBody>
+      </p:sp>
+      <p:cxnSp>
+        <p:nvCxnSpPr>
+          <p:cNvPr id="227" name="Connector: Elbow 226">
+            <a:extLst>
+              <a:ext uri="{FF2B5EF4-FFF2-40B4-BE49-F238E27FC236}">
+                <a16:creationId xmlns:a16="http://schemas.microsoft.com/office/drawing/2014/main" id="{2BC9B4EA-1515-FA18-33E3-AC3DBE4B99A9}"/>
+              </a:ext>
+            </a:extLst>
+          </p:cNvPr>
+          <p:cNvCxnSpPr/>
+          <p:nvPr/>
+        </p:nvCxnSpPr>
+        <p:spPr>
+          <a:xfrm>
+            <a:off x="1770040" y="1042522"/>
+            <a:ext cx="5289911" cy="146564"/>
+          </a:xfrm>
+          <a:prstGeom prst="bentConnector3">
+            <a:avLst>
+              <a:gd name="adj1" fmla="val 76611"/>
+            </a:avLst>
+          </a:prstGeom>
+          <a:ln>
+            <a:prstDash val="dash"/>
+            <a:tailEnd type="triangle"/>
+          </a:ln>
+        </p:spPr>
+        <p:style>
+          <a:lnRef idx="3">
+            <a:schemeClr val="accent2"/>
+          </a:lnRef>
+          <a:fillRef idx="0">
+            <a:schemeClr val="accent2"/>
+          </a:fillRef>
+          <a:effectRef idx="2">
+            <a:schemeClr val="accent2"/>
+          </a:effectRef>
+          <a:fontRef idx="minor">
+            <a:schemeClr val="tx1"/>
+          </a:fontRef>
+        </p:style>
+      </p:cxnSp>
+      <p:cxnSp>
+        <p:nvCxnSpPr>
+          <p:cNvPr id="230" name="Connector: Elbow 229">
+            <a:extLst>
+              <a:ext uri="{FF2B5EF4-FFF2-40B4-BE49-F238E27FC236}">
+                <a16:creationId xmlns:a16="http://schemas.microsoft.com/office/drawing/2014/main" id="{505AE648-061B-7DA0-ED6F-CC8E174880A4}"/>
+              </a:ext>
+            </a:extLst>
+          </p:cNvPr>
+          <p:cNvCxnSpPr>
+            <a:stCxn id="5" idx="3"/>
+            <a:endCxn id="30" idx="1"/>
+          </p:cNvCxnSpPr>
+          <p:nvPr/>
+        </p:nvCxnSpPr>
+        <p:spPr>
+          <a:xfrm flipV="1">
+            <a:off x="7891964" y="563544"/>
+            <a:ext cx="646472" cy="637537"/>
+          </a:xfrm>
+          <a:prstGeom prst="bentConnector3">
+            <a:avLst/>
+          </a:prstGeom>
+          <a:ln>
+            <a:prstDash val="sysDot"/>
+            <a:tailEnd type="triangle"/>
+          </a:ln>
+        </p:spPr>
+        <p:style>
+          <a:lnRef idx="3">
+            <a:schemeClr val="accent2"/>
+          </a:lnRef>
+          <a:fillRef idx="0">
+            <a:schemeClr val="accent2"/>
+          </a:fillRef>
+          <a:effectRef idx="2">
+            <a:schemeClr val="accent2"/>
+          </a:effectRef>
+          <a:fontRef idx="minor">
+            <a:schemeClr val="tx1"/>
+          </a:fontRef>
+        </p:style>
+      </p:cxnSp>
     </p:spTree>
     <p:extLst>
       <p:ext uri="{BB962C8B-B14F-4D97-AF65-F5344CB8AC3E}">
@@ -15565,7 +15853,7 @@
                   <a:schemeClr val="tx1"/>
                 </a:solidFill>
               </a:rPr>
-              <a:t>getAction</a:t>
+              <a:t>get_action</a:t>
             </a:r>
             <a:r>
               <a:rPr lang="en-US" sz="1000" dirty="0">
@@ -15593,7 +15881,7 @@
         <p:spPr>
           <a:xfrm>
             <a:off x="4976366" y="3986248"/>
-            <a:ext cx="1159933" cy="387350"/>
+            <a:ext cx="1346229" cy="387350"/>
           </a:xfrm>
           <a:prstGeom prst="roundRect">
             <a:avLst>
@@ -15641,7 +15929,7 @@
                   <a:schemeClr val="tx1"/>
                 </a:solidFill>
               </a:rPr>
-              <a:t>actionUpdate</a:t>
+              <a:t>update_my_actions</a:t>
             </a:r>
             <a:r>
               <a:rPr lang="en-US" sz="1000" dirty="0">
@@ -15669,7 +15957,7 @@
         <p:spPr>
           <a:xfrm>
             <a:off x="5022044" y="5185670"/>
-            <a:ext cx="1159933" cy="387350"/>
+            <a:ext cx="1396803" cy="387350"/>
           </a:xfrm>
           <a:prstGeom prst="roundRect">
             <a:avLst>
@@ -15717,7 +16005,7 @@
                   <a:schemeClr val="tx1"/>
                 </a:solidFill>
               </a:rPr>
-              <a:t>matchUpdate</a:t>
+              <a:t>update_end_match</a:t>
             </a:r>
             <a:r>
               <a:rPr lang="en-US" sz="1000" dirty="0">
@@ -15745,7 +16033,7 @@
         <p:spPr>
           <a:xfrm>
             <a:off x="5053109" y="1231455"/>
-            <a:ext cx="1159933" cy="387350"/>
+            <a:ext cx="1407849" cy="387350"/>
           </a:xfrm>
           <a:prstGeom prst="roundRect">
             <a:avLst>
@@ -15793,7 +16081,7 @@
                   <a:schemeClr val="tx1"/>
                 </a:solidFill>
               </a:rPr>
-              <a:t>doSpecialAction</a:t>
+              <a:t>do_special_action</a:t>
             </a:r>
             <a:r>
               <a:rPr lang="en-US" sz="1000" dirty="0">
@@ -15865,7 +16153,7 @@
         <p:spPr>
           <a:xfrm>
             <a:off x="5053109" y="1692114"/>
-            <a:ext cx="1159933" cy="387350"/>
+            <a:ext cx="1407849" cy="387350"/>
           </a:xfrm>
           <a:prstGeom prst="roundRect">
             <a:avLst>
@@ -15913,7 +16201,7 @@
                   <a:schemeClr val="tx1"/>
                 </a:solidFill>
               </a:rPr>
-              <a:t>exchangeCards</a:t>
+              <a:t>get_exchanged_cards</a:t>
             </a:r>
             <a:r>
               <a:rPr lang="en-US" sz="1000" dirty="0">
@@ -16277,7 +16565,7 @@
         <p:spPr>
           <a:xfrm>
             <a:off x="7035485" y="4646852"/>
-            <a:ext cx="1159933" cy="387350"/>
+            <a:ext cx="1433517" cy="387350"/>
           </a:xfrm>
           <a:prstGeom prst="roundRect">
             <a:avLst>
@@ -16325,7 +16613,7 @@
                   <a:schemeClr val="tx1"/>
                 </a:solidFill>
               </a:rPr>
-              <a:t>observeOthers</a:t>
+              <a:t>update_action_others</a:t>
             </a:r>
             <a:r>
               <a:rPr lang="en-US" sz="1000" dirty="0">
@@ -16353,7 +16641,7 @@
         <p:spPr>
           <a:xfrm>
             <a:off x="7060253" y="5842901"/>
-            <a:ext cx="1159933" cy="387350"/>
+            <a:ext cx="1329471" cy="387350"/>
           </a:xfrm>
           <a:prstGeom prst="roundRect">
             <a:avLst>
@@ -16401,7 +16689,7 @@
                   <a:schemeClr val="tx1"/>
                 </a:solidFill>
               </a:rPr>
-              <a:t>matchUpdate</a:t>
+              <a:t>update_end_match</a:t>
             </a:r>
             <a:r>
               <a:rPr lang="en-US" sz="1000" dirty="0">
@@ -16512,6 +16800,7 @@
             </a:extLst>
           </p:cNvPr>
           <p:cNvCxnSpPr>
+            <a:cxnSpLocks/>
             <a:endCxn id="75" idx="1"/>
           </p:cNvCxnSpPr>
           <p:nvPr/>
@@ -16689,6 +16978,162 @@
             <a:r>
               <a:rPr lang="en-US" sz="800" b="1" dirty="0"/>
               <a:t>Info {}</a:t>
+            </a:r>
+          </a:p>
+        </p:txBody>
+      </p:sp>
+      <p:sp>
+        <p:nvSpPr>
+          <p:cNvPr id="4" name="Rectangle: Rounded Corners 3">
+            <a:extLst>
+              <a:ext uri="{FF2B5EF4-FFF2-40B4-BE49-F238E27FC236}">
+                <a16:creationId xmlns:a16="http://schemas.microsoft.com/office/drawing/2014/main" id="{F27B43DF-42BE-9676-DCE1-1BBA06BE3420}"/>
+              </a:ext>
+            </a:extLst>
+          </p:cNvPr>
+          <p:cNvSpPr/>
+          <p:nvPr/>
+        </p:nvSpPr>
+        <p:spPr>
+          <a:xfrm>
+            <a:off x="4626917" y="439756"/>
+            <a:ext cx="1595438" cy="387350"/>
+          </a:xfrm>
+          <a:prstGeom prst="roundRect">
+            <a:avLst>
+              <a:gd name="adj" fmla="val 3342"/>
+            </a:avLst>
+          </a:prstGeom>
+          <a:solidFill>
+            <a:schemeClr val="accent6">
+              <a:lumMod val="75000"/>
+              <a:alpha val="10196"/>
+            </a:schemeClr>
+          </a:solidFill>
+          <a:ln>
+            <a:solidFill>
+              <a:srgbClr val="172C51">
+                <a:alpha val="23137"/>
+              </a:srgbClr>
+            </a:solidFill>
+          </a:ln>
+        </p:spPr>
+        <p:style>
+          <a:lnRef idx="2">
+            <a:schemeClr val="accent1">
+              <a:shade val="15000"/>
+            </a:schemeClr>
+          </a:lnRef>
+          <a:fillRef idx="1">
+            <a:schemeClr val="accent1"/>
+          </a:fillRef>
+          <a:effectRef idx="0">
+            <a:schemeClr val="accent1"/>
+          </a:effectRef>
+          <a:fontRef idx="minor">
+            <a:schemeClr val="lt1"/>
+          </a:fontRef>
+        </p:style>
+        <p:txBody>
+          <a:bodyPr rtlCol="0" anchor="ctr"/>
+          <a:lstStyle/>
+          <a:p>
+            <a:r>
+              <a:rPr lang="en-US" sz="1000" dirty="0" err="1">
+                <a:solidFill>
+                  <a:schemeClr val="tx1"/>
+                </a:solidFill>
+                <a:effectLst/>
+                <a:latin typeface="Calibri (Body)"/>
+              </a:rPr>
+              <a:t>update_start_match</a:t>
+            </a:r>
+            <a:r>
+              <a:rPr lang="en-US" sz="1000" dirty="0">
+                <a:solidFill>
+                  <a:schemeClr val="tx1"/>
+                </a:solidFill>
+                <a:effectLst/>
+                <a:latin typeface="Calibri (Body)"/>
+              </a:rPr>
+              <a:t>()</a:t>
+            </a:r>
+          </a:p>
+        </p:txBody>
+      </p:sp>
+      <p:cxnSp>
+        <p:nvCxnSpPr>
+          <p:cNvPr id="9" name="Straight Arrow Connector 8">
+            <a:extLst>
+              <a:ext uri="{FF2B5EF4-FFF2-40B4-BE49-F238E27FC236}">
+                <a16:creationId xmlns:a16="http://schemas.microsoft.com/office/drawing/2014/main" id="{D000AC70-C1AE-4289-6DD2-944391A2A7D2}"/>
+              </a:ext>
+            </a:extLst>
+          </p:cNvPr>
+          <p:cNvCxnSpPr>
+            <a:cxnSpLocks/>
+          </p:cNvCxnSpPr>
+          <p:nvPr/>
+        </p:nvCxnSpPr>
+        <p:spPr>
+          <a:xfrm>
+            <a:off x="3922295" y="646769"/>
+            <a:ext cx="680815" cy="0"/>
+          </a:xfrm>
+          <a:prstGeom prst="straightConnector1">
+            <a:avLst/>
+          </a:prstGeom>
+          <a:ln>
+            <a:prstDash val="dash"/>
+            <a:tailEnd type="triangle"/>
+          </a:ln>
+        </p:spPr>
+        <p:style>
+          <a:lnRef idx="3">
+            <a:schemeClr val="accent2"/>
+          </a:lnRef>
+          <a:fillRef idx="0">
+            <a:schemeClr val="accent2"/>
+          </a:fillRef>
+          <a:effectRef idx="2">
+            <a:schemeClr val="accent2"/>
+          </a:effectRef>
+          <a:fontRef idx="minor">
+            <a:schemeClr val="tx1"/>
+          </a:fontRef>
+        </p:style>
+      </p:cxnSp>
+      <p:sp>
+        <p:nvSpPr>
+          <p:cNvPr id="12" name="TextBox 11">
+            <a:extLst>
+              <a:ext uri="{FF2B5EF4-FFF2-40B4-BE49-F238E27FC236}">
+                <a16:creationId xmlns:a16="http://schemas.microsoft.com/office/drawing/2014/main" id="{7F5A6064-C0B8-A68C-F5B0-C09F63304CD7}"/>
+              </a:ext>
+            </a:extLst>
+          </p:cNvPr>
+          <p:cNvSpPr txBox="1"/>
+          <p:nvPr/>
+        </p:nvSpPr>
+        <p:spPr>
+          <a:xfrm>
+            <a:off x="3874799" y="432314"/>
+            <a:ext cx="740908" cy="215444"/>
+          </a:xfrm>
+          <a:prstGeom prst="rect">
+            <a:avLst/>
+          </a:prstGeom>
+          <a:noFill/>
+        </p:spPr>
+        <p:txBody>
+          <a:bodyPr wrap="none" rtlCol="0">
+            <a:spAutoFit/>
+          </a:bodyPr>
+          <a:lstStyle/>
+          <a:p>
+            <a:r>
+              <a:rPr lang="en-US" sz="800" b="1" dirty="0"/>
+              <a:t>Match status</a:t>
             </a:r>
           </a:p>
         </p:txBody>

</xml_diff>

<commit_message>
Adding the new dataset format
</commit_message>
<xml_diff>
--- a/gitImages/GameCommunicationDiagram.pptx
+++ b/gitImages/GameCommunicationDiagram.pptx
@@ -263,7 +263,7 @@
           <a:p>
             <a:fld id="{67DA5CD7-5721-4865-8FBC-0613AEE566BE}" type="datetimeFigureOut">
               <a:rPr lang="en-US" smtClean="0"/>
-              <a:t>4/17/2024</a:t>
+              <a:t>8/18/2024</a:t>
             </a:fld>
             <a:endParaRPr lang="en-US"/>
           </a:p>
@@ -461,7 +461,7 @@
           <a:p>
             <a:fld id="{67DA5CD7-5721-4865-8FBC-0613AEE566BE}" type="datetimeFigureOut">
               <a:rPr lang="en-US" smtClean="0"/>
-              <a:t>4/17/2024</a:t>
+              <a:t>8/18/2024</a:t>
             </a:fld>
             <a:endParaRPr lang="en-US"/>
           </a:p>
@@ -669,7 +669,7 @@
           <a:p>
             <a:fld id="{67DA5CD7-5721-4865-8FBC-0613AEE566BE}" type="datetimeFigureOut">
               <a:rPr lang="en-US" smtClean="0"/>
-              <a:t>4/17/2024</a:t>
+              <a:t>8/18/2024</a:t>
             </a:fld>
             <a:endParaRPr lang="en-US"/>
           </a:p>
@@ -867,7 +867,7 @@
           <a:p>
             <a:fld id="{67DA5CD7-5721-4865-8FBC-0613AEE566BE}" type="datetimeFigureOut">
               <a:rPr lang="en-US" smtClean="0"/>
-              <a:t>4/17/2024</a:t>
+              <a:t>8/18/2024</a:t>
             </a:fld>
             <a:endParaRPr lang="en-US"/>
           </a:p>
@@ -1142,7 +1142,7 @@
           <a:p>
             <a:fld id="{67DA5CD7-5721-4865-8FBC-0613AEE566BE}" type="datetimeFigureOut">
               <a:rPr lang="en-US" smtClean="0"/>
-              <a:t>4/17/2024</a:t>
+              <a:t>8/18/2024</a:t>
             </a:fld>
             <a:endParaRPr lang="en-US"/>
           </a:p>
@@ -1407,7 +1407,7 @@
           <a:p>
             <a:fld id="{67DA5CD7-5721-4865-8FBC-0613AEE566BE}" type="datetimeFigureOut">
               <a:rPr lang="en-US" smtClean="0"/>
-              <a:t>4/17/2024</a:t>
+              <a:t>8/18/2024</a:t>
             </a:fld>
             <a:endParaRPr lang="en-US"/>
           </a:p>
@@ -1819,7 +1819,7 @@
           <a:p>
             <a:fld id="{67DA5CD7-5721-4865-8FBC-0613AEE566BE}" type="datetimeFigureOut">
               <a:rPr lang="en-US" smtClean="0"/>
-              <a:t>4/17/2024</a:t>
+              <a:t>8/18/2024</a:t>
             </a:fld>
             <a:endParaRPr lang="en-US"/>
           </a:p>
@@ -1960,7 +1960,7 @@
           <a:p>
             <a:fld id="{67DA5CD7-5721-4865-8FBC-0613AEE566BE}" type="datetimeFigureOut">
               <a:rPr lang="en-US" smtClean="0"/>
-              <a:t>4/17/2024</a:t>
+              <a:t>8/18/2024</a:t>
             </a:fld>
             <a:endParaRPr lang="en-US"/>
           </a:p>
@@ -2073,7 +2073,7 @@
           <a:p>
             <a:fld id="{67DA5CD7-5721-4865-8FBC-0613AEE566BE}" type="datetimeFigureOut">
               <a:rPr lang="en-US" smtClean="0"/>
-              <a:t>4/17/2024</a:t>
+              <a:t>8/18/2024</a:t>
             </a:fld>
             <a:endParaRPr lang="en-US"/>
           </a:p>
@@ -2384,7 +2384,7 @@
           <a:p>
             <a:fld id="{67DA5CD7-5721-4865-8FBC-0613AEE566BE}" type="datetimeFigureOut">
               <a:rPr lang="en-US" smtClean="0"/>
-              <a:t>4/17/2024</a:t>
+              <a:t>8/18/2024</a:t>
             </a:fld>
             <a:endParaRPr lang="en-US"/>
           </a:p>
@@ -2672,7 +2672,7 @@
           <a:p>
             <a:fld id="{67DA5CD7-5721-4865-8FBC-0613AEE566BE}" type="datetimeFigureOut">
               <a:rPr lang="en-US" smtClean="0"/>
-              <a:t>4/17/2024</a:t>
+              <a:t>8/18/2024</a:t>
             </a:fld>
             <a:endParaRPr lang="en-US"/>
           </a:p>
@@ -2913,7 +2913,7 @@
           <a:p>
             <a:fld id="{67DA5CD7-5721-4865-8FBC-0613AEE566BE}" type="datetimeFigureOut">
               <a:rPr lang="en-US" smtClean="0"/>
-              <a:t>4/17/2024</a:t>
+              <a:t>8/18/2024</a:t>
             </a:fld>
             <a:endParaRPr lang="en-US"/>
           </a:p>
@@ -5473,7 +5473,7 @@
         </p:nvSpPr>
         <p:spPr>
           <a:xfrm>
-            <a:off x="8100395" y="1281092"/>
+            <a:off x="8130445" y="1480959"/>
             <a:ext cx="1255898" cy="387350"/>
           </a:xfrm>
           <a:prstGeom prst="roundRect">
@@ -5619,9 +5619,9 @@
           <p:nvPr/>
         </p:nvCxnSpPr>
         <p:spPr>
-          <a:xfrm flipV="1">
-            <a:off x="4578287" y="1474767"/>
-            <a:ext cx="3522108" cy="2139"/>
+          <a:xfrm>
+            <a:off x="4578287" y="1476906"/>
+            <a:ext cx="3552158" cy="197728"/>
           </a:xfrm>
           <a:prstGeom prst="bentConnector3">
             <a:avLst/>
@@ -5771,7 +5771,7 @@
         </p:nvSpPr>
         <p:spPr>
           <a:xfrm>
-            <a:off x="8100395" y="1741751"/>
+            <a:off x="8130445" y="1941618"/>
             <a:ext cx="1429368" cy="387350"/>
           </a:xfrm>
           <a:prstGeom prst="roundRect">
@@ -6092,9 +6092,9 @@
           <p:nvPr/>
         </p:nvCxnSpPr>
         <p:spPr>
-          <a:xfrm flipV="1">
-            <a:off x="4577599" y="1935426"/>
-            <a:ext cx="3522796" cy="1564"/>
+          <a:xfrm>
+            <a:off x="4577599" y="1936990"/>
+            <a:ext cx="3552846" cy="198303"/>
           </a:xfrm>
           <a:prstGeom prst="bentConnector3">
             <a:avLst/>
@@ -6816,7 +6816,7 @@
         <p:spPr>
           <a:xfrm flipV="1">
             <a:off x="3695604" y="6086213"/>
-            <a:ext cx="6507899" cy="44964"/>
+            <a:ext cx="6507899" cy="39145"/>
           </a:xfrm>
           <a:prstGeom prst="straightConnector1">
             <a:avLst/>
@@ -7305,6 +7305,281 @@
           </a:fontRef>
         </p:style>
       </p:cxnSp>
+      <p:sp>
+        <p:nvSpPr>
+          <p:cNvPr id="5" name="Rectangle: Rounded Corners 4">
+            <a:extLst>
+              <a:ext uri="{FF2B5EF4-FFF2-40B4-BE49-F238E27FC236}">
+                <a16:creationId xmlns:a16="http://schemas.microsoft.com/office/drawing/2014/main" id="{E8F0AA2F-DB55-CB76-D7EC-56F9F0F8806A}"/>
+              </a:ext>
+            </a:extLst>
+          </p:cNvPr>
+          <p:cNvSpPr/>
+          <p:nvPr/>
+        </p:nvSpPr>
+        <p:spPr>
+          <a:xfrm>
+            <a:off x="9950539" y="3904790"/>
+            <a:ext cx="1589309" cy="387350"/>
+          </a:xfrm>
+          <a:prstGeom prst="roundRect">
+            <a:avLst>
+              <a:gd name="adj" fmla="val 3342"/>
+            </a:avLst>
+          </a:prstGeom>
+          <a:solidFill>
+            <a:schemeClr val="accent6">
+              <a:lumMod val="75000"/>
+              <a:alpha val="10196"/>
+            </a:schemeClr>
+          </a:solidFill>
+          <a:ln>
+            <a:solidFill>
+              <a:srgbClr val="172C51">
+                <a:alpha val="23137"/>
+              </a:srgbClr>
+            </a:solidFill>
+          </a:ln>
+        </p:spPr>
+        <p:style>
+          <a:lnRef idx="2">
+            <a:schemeClr val="accent1">
+              <a:shade val="15000"/>
+            </a:schemeClr>
+          </a:lnRef>
+          <a:fillRef idx="1">
+            <a:schemeClr val="accent1"/>
+          </a:fillRef>
+          <a:effectRef idx="0">
+            <a:schemeClr val="accent1"/>
+          </a:effectRef>
+          <a:fontRef idx="minor">
+            <a:schemeClr val="lt1"/>
+          </a:fontRef>
+        </p:style>
+        <p:txBody>
+          <a:bodyPr rtlCol="0" anchor="ctr"/>
+          <a:lstStyle/>
+          <a:p>
+            <a:pPr algn="ctr"/>
+            <a:r>
+              <a:rPr lang="en-US" sz="1000" dirty="0" err="1">
+                <a:solidFill>
+                  <a:schemeClr val="tx1"/>
+                </a:solidFill>
+              </a:rPr>
+              <a:t>observe_special_action</a:t>
+            </a:r>
+            <a:r>
+              <a:rPr lang="en-US" sz="1000" dirty="0">
+                <a:solidFill>
+                  <a:schemeClr val="tx1"/>
+                </a:solidFill>
+              </a:rPr>
+              <a:t>()</a:t>
+            </a:r>
+          </a:p>
+        </p:txBody>
+      </p:sp>
+      <p:cxnSp>
+        <p:nvCxnSpPr>
+          <p:cNvPr id="13" name="Connector: Elbow 12">
+            <a:extLst>
+              <a:ext uri="{FF2B5EF4-FFF2-40B4-BE49-F238E27FC236}">
+                <a16:creationId xmlns:a16="http://schemas.microsoft.com/office/drawing/2014/main" id="{7B3C7644-B21E-A9DE-946F-2AC8D900E7B9}"/>
+              </a:ext>
+            </a:extLst>
+          </p:cNvPr>
+          <p:cNvCxnSpPr>
+            <a:cxnSpLocks/>
+            <a:endCxn id="5" idx="0"/>
+          </p:cNvCxnSpPr>
+          <p:nvPr/>
+        </p:nvCxnSpPr>
+        <p:spPr>
+          <a:xfrm>
+            <a:off x="5449480" y="1354313"/>
+            <a:ext cx="5295714" cy="2550477"/>
+          </a:xfrm>
+          <a:prstGeom prst="bentConnector2">
+            <a:avLst/>
+          </a:prstGeom>
+          <a:ln>
+            <a:prstDash val="dash"/>
+            <a:headEnd type="triangle" w="med" len="med"/>
+            <a:tailEnd type="triangle" w="med" len="med"/>
+          </a:ln>
+        </p:spPr>
+        <p:style>
+          <a:lnRef idx="3">
+            <a:schemeClr val="accent2"/>
+          </a:lnRef>
+          <a:fillRef idx="0">
+            <a:schemeClr val="accent2"/>
+          </a:fillRef>
+          <a:effectRef idx="2">
+            <a:schemeClr val="accent2"/>
+          </a:effectRef>
+          <a:fontRef idx="minor">
+            <a:schemeClr val="tx1"/>
+          </a:fontRef>
+        </p:style>
+      </p:cxnSp>
+      <p:sp>
+        <p:nvSpPr>
+          <p:cNvPr id="32" name="Rectangle: Rounded Corners 31">
+            <a:extLst>
+              <a:ext uri="{FF2B5EF4-FFF2-40B4-BE49-F238E27FC236}">
+                <a16:creationId xmlns:a16="http://schemas.microsoft.com/office/drawing/2014/main" id="{D2EEC68F-CA5E-4418-88FE-481201789A5C}"/>
+              </a:ext>
+            </a:extLst>
+          </p:cNvPr>
+          <p:cNvSpPr/>
+          <p:nvPr/>
+        </p:nvSpPr>
+        <p:spPr>
+          <a:xfrm>
+            <a:off x="10187687" y="6344763"/>
+            <a:ext cx="1336345" cy="387350"/>
+          </a:xfrm>
+          <a:prstGeom prst="roundRect">
+            <a:avLst>
+              <a:gd name="adj" fmla="val 3342"/>
+            </a:avLst>
+          </a:prstGeom>
+          <a:solidFill>
+            <a:schemeClr val="accent6">
+              <a:lumMod val="75000"/>
+              <a:alpha val="10196"/>
+            </a:schemeClr>
+          </a:solidFill>
+          <a:ln>
+            <a:solidFill>
+              <a:srgbClr val="172C51">
+                <a:alpha val="23137"/>
+              </a:srgbClr>
+            </a:solidFill>
+          </a:ln>
+        </p:spPr>
+        <p:style>
+          <a:lnRef idx="2">
+            <a:schemeClr val="accent1">
+              <a:shade val="15000"/>
+            </a:schemeClr>
+          </a:lnRef>
+          <a:fillRef idx="1">
+            <a:schemeClr val="accent1"/>
+          </a:fillRef>
+          <a:effectRef idx="0">
+            <a:schemeClr val="accent1"/>
+          </a:effectRef>
+          <a:fontRef idx="minor">
+            <a:schemeClr val="lt1"/>
+          </a:fontRef>
+        </p:style>
+        <p:txBody>
+          <a:bodyPr rtlCol="0" anchor="ctr"/>
+          <a:lstStyle/>
+          <a:p>
+            <a:pPr algn="ctr"/>
+            <a:r>
+              <a:rPr lang="en-US" sz="1000" dirty="0" err="1">
+                <a:solidFill>
+                  <a:schemeClr val="tx1"/>
+                </a:solidFill>
+              </a:rPr>
+              <a:t>update_game_over</a:t>
+            </a:r>
+            <a:r>
+              <a:rPr lang="en-US" sz="1000" dirty="0">
+                <a:solidFill>
+                  <a:schemeClr val="tx1"/>
+                </a:solidFill>
+              </a:rPr>
+              <a:t>()</a:t>
+            </a:r>
+          </a:p>
+        </p:txBody>
+      </p:sp>
+      <p:cxnSp>
+        <p:nvCxnSpPr>
+          <p:cNvPr id="33" name="Straight Arrow Connector 32">
+            <a:extLst>
+              <a:ext uri="{FF2B5EF4-FFF2-40B4-BE49-F238E27FC236}">
+                <a16:creationId xmlns:a16="http://schemas.microsoft.com/office/drawing/2014/main" id="{AA9A642F-8FE7-7AA9-8B46-8C9ECC3F80A5}"/>
+              </a:ext>
+            </a:extLst>
+          </p:cNvPr>
+          <p:cNvCxnSpPr>
+            <a:cxnSpLocks/>
+            <a:stCxn id="37" idx="3"/>
+            <a:endCxn id="32" idx="1"/>
+          </p:cNvCxnSpPr>
+          <p:nvPr/>
+        </p:nvCxnSpPr>
+        <p:spPr>
+          <a:xfrm>
+            <a:off x="3881466" y="6516553"/>
+            <a:ext cx="6306221" cy="21885"/>
+          </a:xfrm>
+          <a:prstGeom prst="straightConnector1">
+            <a:avLst/>
+          </a:prstGeom>
+          <a:ln>
+            <a:prstDash val="dash"/>
+            <a:tailEnd type="triangle"/>
+          </a:ln>
+        </p:spPr>
+        <p:style>
+          <a:lnRef idx="3">
+            <a:schemeClr val="accent2"/>
+          </a:lnRef>
+          <a:fillRef idx="0">
+            <a:schemeClr val="accent2"/>
+          </a:fillRef>
+          <a:effectRef idx="2">
+            <a:schemeClr val="accent2"/>
+          </a:effectRef>
+          <a:fontRef idx="minor">
+            <a:schemeClr val="tx1"/>
+          </a:fontRef>
+        </p:style>
+      </p:cxnSp>
+      <p:sp>
+        <p:nvSpPr>
+          <p:cNvPr id="37" name="TextBox 36">
+            <a:extLst>
+              <a:ext uri="{FF2B5EF4-FFF2-40B4-BE49-F238E27FC236}">
+                <a16:creationId xmlns:a16="http://schemas.microsoft.com/office/drawing/2014/main" id="{3EB53AA3-391E-F382-4400-47549DCD3355}"/>
+              </a:ext>
+            </a:extLst>
+          </p:cNvPr>
+          <p:cNvSpPr txBox="1"/>
+          <p:nvPr/>
+        </p:nvSpPr>
+        <p:spPr>
+          <a:xfrm>
+            <a:off x="3247959" y="6408831"/>
+            <a:ext cx="633507" cy="215444"/>
+          </a:xfrm>
+          <a:prstGeom prst="rect">
+            <a:avLst/>
+          </a:prstGeom>
+          <a:noFill/>
+        </p:spPr>
+        <p:txBody>
+          <a:bodyPr wrap="none" rtlCol="0">
+            <a:spAutoFit/>
+          </a:bodyPr>
+          <a:lstStyle/>
+          <a:p>
+            <a:r>
+              <a:rPr lang="en-US" sz="800" b="1" dirty="0"/>
+              <a:t>End game!</a:t>
+            </a:r>
+          </a:p>
+        </p:txBody>
+      </p:sp>
     </p:spTree>
     <p:extLst>
       <p:ext uri="{BB962C8B-B14F-4D97-AF65-F5344CB8AC3E}">
@@ -17134,6 +17409,158 @@
             <a:r>
               <a:rPr lang="en-US" sz="800" b="1" dirty="0"/>
               <a:t>Match status</a:t>
+            </a:r>
+          </a:p>
+        </p:txBody>
+      </p:sp>
+      <p:sp>
+        <p:nvSpPr>
+          <p:cNvPr id="2" name="Rectangle: Rounded Corners 1">
+            <a:extLst>
+              <a:ext uri="{FF2B5EF4-FFF2-40B4-BE49-F238E27FC236}">
+                <a16:creationId xmlns:a16="http://schemas.microsoft.com/office/drawing/2014/main" id="{9BD1239C-91C1-302E-2B96-D9591D07FEF2}"/>
+              </a:ext>
+            </a:extLst>
+          </p:cNvPr>
+          <p:cNvSpPr/>
+          <p:nvPr/>
+        </p:nvSpPr>
+        <p:spPr>
+          <a:xfrm>
+            <a:off x="6834310" y="3863918"/>
+            <a:ext cx="1589309" cy="387350"/>
+          </a:xfrm>
+          <a:prstGeom prst="roundRect">
+            <a:avLst>
+              <a:gd name="adj" fmla="val 3342"/>
+            </a:avLst>
+          </a:prstGeom>
+          <a:solidFill>
+            <a:schemeClr val="accent6">
+              <a:lumMod val="75000"/>
+              <a:alpha val="10196"/>
+            </a:schemeClr>
+          </a:solidFill>
+          <a:ln>
+            <a:solidFill>
+              <a:srgbClr val="172C51">
+                <a:alpha val="23137"/>
+              </a:srgbClr>
+            </a:solidFill>
+          </a:ln>
+        </p:spPr>
+        <p:style>
+          <a:lnRef idx="2">
+            <a:schemeClr val="accent1">
+              <a:shade val="15000"/>
+            </a:schemeClr>
+          </a:lnRef>
+          <a:fillRef idx="1">
+            <a:schemeClr val="accent1"/>
+          </a:fillRef>
+          <a:effectRef idx="0">
+            <a:schemeClr val="accent1"/>
+          </a:effectRef>
+          <a:fontRef idx="minor">
+            <a:schemeClr val="lt1"/>
+          </a:fontRef>
+        </p:style>
+        <p:txBody>
+          <a:bodyPr rtlCol="0" anchor="ctr"/>
+          <a:lstStyle/>
+          <a:p>
+            <a:pPr algn="ctr"/>
+            <a:r>
+              <a:rPr lang="en-US" sz="1000" dirty="0" err="1">
+                <a:solidFill>
+                  <a:schemeClr val="tx1"/>
+                </a:solidFill>
+              </a:rPr>
+              <a:t>observe_special_action</a:t>
+            </a:r>
+            <a:r>
+              <a:rPr lang="en-US" sz="1000" dirty="0">
+                <a:solidFill>
+                  <a:schemeClr val="tx1"/>
+                </a:solidFill>
+              </a:rPr>
+              <a:t>()</a:t>
+            </a:r>
+          </a:p>
+        </p:txBody>
+      </p:sp>
+      <p:sp>
+        <p:nvSpPr>
+          <p:cNvPr id="3" name="Rectangle: Rounded Corners 2">
+            <a:extLst>
+              <a:ext uri="{FF2B5EF4-FFF2-40B4-BE49-F238E27FC236}">
+                <a16:creationId xmlns:a16="http://schemas.microsoft.com/office/drawing/2014/main" id="{FC7A886D-4E69-D654-D625-56B778D1B113}"/>
+              </a:ext>
+            </a:extLst>
+          </p:cNvPr>
+          <p:cNvSpPr/>
+          <p:nvPr/>
+        </p:nvSpPr>
+        <p:spPr>
+          <a:xfrm>
+            <a:off x="7071458" y="6303891"/>
+            <a:ext cx="1336345" cy="387350"/>
+          </a:xfrm>
+          <a:prstGeom prst="roundRect">
+            <a:avLst>
+              <a:gd name="adj" fmla="val 3342"/>
+            </a:avLst>
+          </a:prstGeom>
+          <a:solidFill>
+            <a:schemeClr val="accent6">
+              <a:lumMod val="75000"/>
+              <a:alpha val="10196"/>
+            </a:schemeClr>
+          </a:solidFill>
+          <a:ln>
+            <a:solidFill>
+              <a:srgbClr val="172C51">
+                <a:alpha val="23137"/>
+              </a:srgbClr>
+            </a:solidFill>
+          </a:ln>
+        </p:spPr>
+        <p:style>
+          <a:lnRef idx="2">
+            <a:schemeClr val="accent1">
+              <a:shade val="15000"/>
+            </a:schemeClr>
+          </a:lnRef>
+          <a:fillRef idx="1">
+            <a:schemeClr val="accent1"/>
+          </a:fillRef>
+          <a:effectRef idx="0">
+            <a:schemeClr val="accent1"/>
+          </a:effectRef>
+          <a:fontRef idx="minor">
+            <a:schemeClr val="lt1"/>
+          </a:fontRef>
+        </p:style>
+        <p:txBody>
+          <a:bodyPr rtlCol="0" anchor="ctr"/>
+          <a:lstStyle/>
+          <a:p>
+            <a:pPr algn="ctr"/>
+            <a:r>
+              <a:rPr lang="en-US" sz="1000" dirty="0" err="1">
+                <a:solidFill>
+                  <a:schemeClr val="tx1"/>
+                </a:solidFill>
+              </a:rPr>
+              <a:t>update_game_over</a:t>
+            </a:r>
+            <a:r>
+              <a:rPr lang="en-US" sz="1000" dirty="0">
+                <a:solidFill>
+                  <a:schemeClr val="tx1"/>
+                </a:solidFill>
+              </a:rPr>
+              <a:t>()</a:t>
             </a:r>
           </a:p>
         </p:txBody>

</xml_diff>